<commit_message>
Initial commit- Files updated successfully
</commit_message>
<xml_diff>
--- a/IBM-Project.pptx
+++ b/IBM-Project.pptx
@@ -288,10 +288,25 @@
   <pc:docChgLst>
     <pc:chgData name="Tushar Kumar" userId="8aef513c0bbad679" providerId="LiveId" clId="{BBAB3278-5544-4812-8550-2699BC292CB5}"/>
     <pc:docChg chg="modSld">
-      <pc:chgData name="Tushar Kumar" userId="8aef513c0bbad679" providerId="LiveId" clId="{BBAB3278-5544-4812-8550-2699BC292CB5}" dt="2025-08-01T12:39:50.136" v="0"/>
+      <pc:chgData name="Tushar Kumar" userId="8aef513c0bbad679" providerId="LiveId" clId="{BBAB3278-5544-4812-8550-2699BC292CB5}" dt="2025-08-01T13:44:42.399" v="31" actId="20577"/>
       <pc:docMkLst>
         <pc:docMk/>
       </pc:docMkLst>
+      <pc:sldChg chg="modSp mod">
+        <pc:chgData name="Tushar Kumar" userId="8aef513c0bbad679" providerId="LiveId" clId="{BBAB3278-5544-4812-8550-2699BC292CB5}" dt="2025-08-01T13:44:42.399" v="31" actId="20577"/>
+        <pc:sldMkLst>
+          <pc:docMk/>
+          <pc:sldMk cId="953325580" sldId="256"/>
+        </pc:sldMkLst>
+        <pc:spChg chg="mod">
+          <ac:chgData name="Tushar Kumar" userId="8aef513c0bbad679" providerId="LiveId" clId="{BBAB3278-5544-4812-8550-2699BC292CB5}" dt="2025-08-01T13:44:42.399" v="31" actId="20577"/>
+          <ac:spMkLst>
+            <pc:docMk/>
+            <pc:sldMk cId="953325580" sldId="256"/>
+            <ac:spMk id="2" creationId="{A8A11E26-4C38-41A6-9857-11032CEECD80}"/>
+          </ac:spMkLst>
+        </pc:spChg>
+      </pc:sldChg>
       <pc:sldChg chg="modSp">
         <pc:chgData name="Tushar Kumar" userId="8aef513c0bbad679" providerId="LiveId" clId="{BBAB3278-5544-4812-8550-2699BC292CB5}" dt="2025-08-01T12:39:50.136" v="0"/>
         <pc:sldMkLst>
@@ -4677,7 +4692,7 @@
                 <a:latin typeface="Arial" panose="020B0604020202020204" pitchFamily="34" charset="0"/>
                 <a:cs typeface="Arial" panose="020B0604020202020204" pitchFamily="34" charset="0"/>
               </a:rPr>
-              <a:t>Learning Agent</a:t>
+              <a:t>Course pathway Learning Agent</a:t>
             </a:r>
           </a:p>
         </p:txBody>
@@ -8223,20 +8238,20 @@
 </file>
 
 <file path=customXml/item1.xml><?xml version="1.0" encoding="utf-8"?>
+<p:properties xmlns:p="http://schemas.microsoft.com/office/2006/metadata/properties" xmlns:xsi="http://www.w3.org/2001/XMLSchema-instance" xmlns:pc="http://schemas.microsoft.com/office/infopath/2007/PartnerControls">
+  <documentManagement>
+    <_activity xmlns="b30265f8-c5e2-4918-b4a1-b977299ca3e2" xsi:nil="true"/>
+  </documentManagement>
+</p:properties>
+</file>
+
+<file path=customXml/item2.xml><?xml version="1.0" encoding="utf-8"?>
 <?mso-contentType ?>
 <FormTemplates xmlns="http://schemas.microsoft.com/sharepoint/v3/contenttype/forms">
   <Display>DocumentLibraryForm</Display>
   <Edit>DocumentLibraryForm</Edit>
   <New>DocumentLibraryForm</New>
 </FormTemplates>
-</file>
-
-<file path=customXml/item2.xml><?xml version="1.0" encoding="utf-8"?>
-<p:properties xmlns:p="http://schemas.microsoft.com/office/2006/metadata/properties" xmlns:xsi="http://www.w3.org/2001/XMLSchema-instance" xmlns:pc="http://schemas.microsoft.com/office/infopath/2007/PartnerControls">
-  <documentManagement>
-    <_activity xmlns="b30265f8-c5e2-4918-b4a1-b977299ca3e2" xsi:nil="true"/>
-  </documentManagement>
-</p:properties>
 </file>
 
 <file path=customXml/item3.xml><?xml version="1.0" encoding="utf-8"?>
@@ -8473,14 +8488,6 @@
 </file>
 
 <file path=customXml/itemProps1.xml><?xml version="1.0" encoding="utf-8"?>
-<ds:datastoreItem xmlns:ds="http://schemas.openxmlformats.org/officeDocument/2006/customXml" ds:itemID="{927BD4C1-B6B1-4715-ABF9-E660A51A4EA0}">
-  <ds:schemaRefs>
-    <ds:schemaRef ds:uri="http://schemas.microsoft.com/sharepoint/v3/contenttype/forms"/>
-  </ds:schemaRefs>
-</ds:datastoreItem>
-</file>
-
-<file path=customXml/itemProps2.xml><?xml version="1.0" encoding="utf-8"?>
 <ds:datastoreItem xmlns:ds="http://schemas.openxmlformats.org/officeDocument/2006/customXml" ds:itemID="{8D289AE2-D2AE-49D1-AFAC-3A79F6794255}">
   <ds:schemaRefs>
     <ds:schemaRef ds:uri="http://www.w3.org/XML/1998/namespace"/>
@@ -8493,6 +8500,14 @@
     <ds:schemaRef ds:uri="http://schemas.openxmlformats.org/package/2006/metadata/core-properties"/>
     <ds:schemaRef ds:uri="b30265f8-c5e2-4918-b4a1-b977299ca3e2"/>
     <ds:schemaRef ds:uri="http://schemas.microsoft.com/office/2006/metadata/properties"/>
+  </ds:schemaRefs>
+</ds:datastoreItem>
+</file>
+
+<file path=customXml/itemProps2.xml><?xml version="1.0" encoding="utf-8"?>
+<ds:datastoreItem xmlns:ds="http://schemas.openxmlformats.org/officeDocument/2006/customXml" ds:itemID="{927BD4C1-B6B1-4715-ABF9-E660A51A4EA0}">
+  <ds:schemaRefs>
+    <ds:schemaRef ds:uri="http://schemas.microsoft.com/sharepoint/v3/contenttype/forms"/>
   </ds:schemaRefs>
 </ds:datastoreItem>
 </file>

</xml_diff>